<commit_message>
Powerpoint as pdf, as delivered
</commit_message>
<xml_diff>
--- a/testing - how to keep it simple.pptx
+++ b/testing - how to keep it simple.pptx
@@ -5,7 +5,7 @@
     <p:sldMasterId id="2147483840" r:id="rId1"/>
   </p:sldMasterIdLst>
   <p:notesMasterIdLst>
-    <p:notesMasterId r:id="rId16"/>
+    <p:notesMasterId r:id="rId18"/>
   </p:notesMasterIdLst>
   <p:sldIdLst>
     <p:sldId id="256" r:id="rId2"/>
@@ -19,9 +19,11 @@
     <p:sldId id="264" r:id="rId10"/>
     <p:sldId id="265" r:id="rId11"/>
     <p:sldId id="266" r:id="rId12"/>
-    <p:sldId id="267" r:id="rId13"/>
-    <p:sldId id="268" r:id="rId14"/>
-    <p:sldId id="269" r:id="rId15"/>
+    <p:sldId id="271" r:id="rId13"/>
+    <p:sldId id="267" r:id="rId14"/>
+    <p:sldId id="268" r:id="rId15"/>
+    <p:sldId id="270" r:id="rId16"/>
+    <p:sldId id="269" r:id="rId17"/>
   </p:sldIdLst>
   <p:sldSz cx="12192000" cy="6858000"/>
   <p:notesSz cx="6858000" cy="9144000"/>
@@ -120,6 +122,11 @@
       </a:defRPr>
     </a:lvl9pPr>
   </p:defaultTextStyle>
+  <p:extLst>
+    <p:ext uri="{EFAFB233-063F-42B5-8137-9DF3F51BA10A}">
+      <p15:sldGuideLst xmlns:p15="http://schemas.microsoft.com/office/powerpoint/2012/main"/>
+    </p:ext>
+  </p:extLst>
 </p:presentation>
 </file>
 
@@ -205,7 +212,7 @@
           <a:p>
             <a:fld id="{F674930E-748F-4FF4-AC05-9DC6DEE726B9}" type="datetimeFigureOut">
               <a:rPr lang="en-GB" smtClean="0"/>
-              <a:t>2018-06-09</a:t>
+              <a:t>2018-06-10</a:t>
             </a:fld>
             <a:endParaRPr lang="en-GB"/>
           </a:p>
@@ -696,6 +703,90 @@
 </p:notes>
 </file>
 
+<file path=ppt/notesSlides/notesSlide3.xml><?xml version="1.0" encoding="utf-8"?>
+<p:notes xmlns:a="http://schemas.openxmlformats.org/drawingml/2006/main" xmlns:r="http://schemas.openxmlformats.org/officeDocument/2006/relationships" xmlns:p="http://schemas.openxmlformats.org/presentationml/2006/main">
+  <p:cSld>
+    <p:spTree>
+      <p:nvGrpSpPr>
+        <p:cNvPr id="1" name=""/>
+        <p:cNvGrpSpPr/>
+        <p:nvPr/>
+      </p:nvGrpSpPr>
+      <p:grpSpPr>
+        <a:xfrm>
+          <a:off x="0" y="0"/>
+          <a:ext cx="0" cy="0"/>
+          <a:chOff x="0" y="0"/>
+          <a:chExt cx="0" cy="0"/>
+        </a:xfrm>
+      </p:grpSpPr>
+      <p:sp>
+        <p:nvSpPr>
+          <p:cNvPr id="2" name="Slide Image Placeholder 1"/>
+          <p:cNvSpPr>
+            <a:spLocks noGrp="1" noRot="1" noChangeAspect="1"/>
+          </p:cNvSpPr>
+          <p:nvPr>
+            <p:ph type="sldImg"/>
+          </p:nvPr>
+        </p:nvSpPr>
+        <p:spPr/>
+      </p:sp>
+      <p:sp>
+        <p:nvSpPr>
+          <p:cNvPr id="3" name="Notes Placeholder 2"/>
+          <p:cNvSpPr>
+            <a:spLocks noGrp="1"/>
+          </p:cNvSpPr>
+          <p:nvPr>
+            <p:ph type="body" idx="1"/>
+          </p:nvPr>
+        </p:nvSpPr>
+        <p:spPr/>
+        <p:txBody>
+          <a:bodyPr/>
+          <a:lstStyle/>
+          <a:p>
+            <a:endParaRPr lang="en-GB" dirty="0"/>
+          </a:p>
+        </p:txBody>
+      </p:sp>
+      <p:sp>
+        <p:nvSpPr>
+          <p:cNvPr id="4" name="Slide Number Placeholder 3"/>
+          <p:cNvSpPr>
+            <a:spLocks noGrp="1"/>
+          </p:cNvSpPr>
+          <p:nvPr>
+            <p:ph type="sldNum" sz="quarter" idx="10"/>
+          </p:nvPr>
+        </p:nvSpPr>
+        <p:spPr/>
+        <p:txBody>
+          <a:bodyPr/>
+          <a:lstStyle/>
+          <a:p>
+            <a:fld id="{AEAAE320-E608-477D-8AAD-5C33E5F4C127}" type="slidenum">
+              <a:rPr lang="en-GB" smtClean="0"/>
+              <a:t>11</a:t>
+            </a:fld>
+            <a:endParaRPr lang="en-GB"/>
+          </a:p>
+        </p:txBody>
+      </p:sp>
+    </p:spTree>
+    <p:extLst>
+      <p:ext uri="{BB962C8B-B14F-4D97-AF65-F5344CB8AC3E}">
+        <p14:creationId xmlns:p14="http://schemas.microsoft.com/office/powerpoint/2010/main" val="344034754"/>
+      </p:ext>
+    </p:extLst>
+  </p:cSld>
+  <p:clrMapOvr>
+    <a:masterClrMapping/>
+  </p:clrMapOvr>
+</p:notes>
+</file>
+
 <file path=ppt/slideLayouts/slideLayout1.xml><?xml version="1.0" encoding="utf-8"?>
 <p:sldLayout xmlns:a="http://schemas.openxmlformats.org/drawingml/2006/main" xmlns:r="http://schemas.openxmlformats.org/officeDocument/2006/relationships" xmlns:p="http://schemas.openxmlformats.org/presentationml/2006/main" type="title" preserve="1">
   <p:cSld name="Title Slide">
@@ -882,7 +973,7 @@
             <a:fld id="{8E36636D-D922-432D-A958-524484B5923D}" type="datetimeFigureOut">
               <a:rPr lang="en-US" dirty="0"/>
               <a:pPr/>
-              <a:t>6/9/2018</a:t>
+              <a:t>6/10/2018</a:t>
             </a:fld>
             <a:endParaRPr lang="en-US" dirty="0"/>
           </a:p>
@@ -1176,7 +1267,7 @@
           <a:p>
             <a:fld id="{48A87A34-81AB-432B-8DAE-1953F412C126}" type="datetimeFigureOut">
               <a:rPr lang="en-US" dirty="0"/>
-              <a:t>6/9/2018</a:t>
+              <a:t>6/10/2018</a:t>
             </a:fld>
             <a:endParaRPr lang="en-US" dirty="0"/>
           </a:p>
@@ -1363,7 +1454,7 @@
           <a:p>
             <a:fld id="{48A87A34-81AB-432B-8DAE-1953F412C126}" type="datetimeFigureOut">
               <a:rPr lang="en-US" dirty="0"/>
-              <a:t>6/9/2018</a:t>
+              <a:t>6/10/2018</a:t>
             </a:fld>
             <a:endParaRPr lang="en-US" dirty="0"/>
           </a:p>
@@ -1619,7 +1710,7 @@
           <a:p>
             <a:fld id="{48A87A34-81AB-432B-8DAE-1953F412C126}" type="datetimeFigureOut">
               <a:rPr lang="en-US" dirty="0"/>
-              <a:t>6/9/2018</a:t>
+              <a:t>6/10/2018</a:t>
             </a:fld>
             <a:endParaRPr lang="en-US" dirty="0"/>
           </a:p>
@@ -2038,7 +2129,7 @@
           <a:p>
             <a:fld id="{48A87A34-81AB-432B-8DAE-1953F412C126}" type="datetimeFigureOut">
               <a:rPr lang="en-US" dirty="0"/>
-              <a:t>6/9/2018</a:t>
+              <a:t>6/10/2018</a:t>
             </a:fld>
             <a:endParaRPr lang="en-US" dirty="0"/>
           </a:p>
@@ -2570,7 +2661,7 @@
           <a:p>
             <a:fld id="{48A87A34-81AB-432B-8DAE-1953F412C126}" type="datetimeFigureOut">
               <a:rPr lang="en-US" dirty="0"/>
-              <a:t>6/9/2018</a:t>
+              <a:t>6/10/2018</a:t>
             </a:fld>
             <a:endParaRPr lang="en-US" dirty="0"/>
           </a:p>
@@ -3429,7 +3520,7 @@
           <a:p>
             <a:fld id="{48A87A34-81AB-432B-8DAE-1953F412C126}" type="datetimeFigureOut">
               <a:rPr lang="en-US" dirty="0"/>
-              <a:t>6/9/2018</a:t>
+              <a:t>6/10/2018</a:t>
             </a:fld>
             <a:endParaRPr lang="en-US" dirty="0"/>
           </a:p>
@@ -3595,7 +3686,7 @@
             <a:fld id="{8E36636D-D922-432D-A958-524484B5923D}" type="datetimeFigureOut">
               <a:rPr lang="en-US" dirty="0"/>
               <a:pPr/>
-              <a:t>6/9/2018</a:t>
+              <a:t>6/10/2018</a:t>
             </a:fld>
             <a:endParaRPr lang="en-US" dirty="0"/>
           </a:p>
@@ -3776,7 +3867,7 @@
             <a:fld id="{8E36636D-D922-432D-A958-524484B5923D}" type="datetimeFigureOut">
               <a:rPr lang="en-US" dirty="0"/>
               <a:pPr/>
-              <a:t>6/9/2018</a:t>
+              <a:t>6/10/2018</a:t>
             </a:fld>
             <a:endParaRPr lang="en-US" dirty="0"/>
           </a:p>
@@ -3943,7 +4034,7 @@
             <a:fld id="{8E36636D-D922-432D-A958-524484B5923D}" type="datetimeFigureOut">
               <a:rPr lang="en-US" dirty="0"/>
               <a:pPr/>
-              <a:t>6/9/2018</a:t>
+              <a:t>6/10/2018</a:t>
             </a:fld>
             <a:endParaRPr lang="en-US" dirty="0"/>
           </a:p>
@@ -4184,7 +4275,7 @@
             <a:fld id="{8E36636D-D922-432D-A958-524484B5923D}" type="datetimeFigureOut">
               <a:rPr lang="en-US" dirty="0"/>
               <a:pPr/>
-              <a:t>6/9/2018</a:t>
+              <a:t>6/10/2018</a:t>
             </a:fld>
             <a:endParaRPr lang="en-US" dirty="0"/>
           </a:p>
@@ -4417,7 +4508,7 @@
             <a:fld id="{8E36636D-D922-432D-A958-524484B5923D}" type="datetimeFigureOut">
               <a:rPr lang="en-US" dirty="0"/>
               <a:pPr/>
-              <a:t>6/9/2018</a:t>
+              <a:t>6/10/2018</a:t>
             </a:fld>
             <a:endParaRPr lang="en-US" dirty="0"/>
           </a:p>
@@ -4880,7 +4971,7 @@
             <a:fld id="{8E36636D-D922-432D-A958-524484B5923D}" type="datetimeFigureOut">
               <a:rPr lang="en-US" dirty="0"/>
               <a:pPr/>
-              <a:t>6/9/2018</a:t>
+              <a:t>6/10/2018</a:t>
             </a:fld>
             <a:endParaRPr lang="en-US" dirty="0"/>
           </a:p>
@@ -4995,7 +5086,7 @@
             <a:fld id="{8E36636D-D922-432D-A958-524484B5923D}" type="datetimeFigureOut">
               <a:rPr lang="en-US" dirty="0"/>
               <a:pPr/>
-              <a:t>6/9/2018</a:t>
+              <a:t>6/10/2018</a:t>
             </a:fld>
             <a:endParaRPr lang="en-US" dirty="0"/>
           </a:p>
@@ -5087,7 +5178,7 @@
             <a:fld id="{8E36636D-D922-432D-A958-524484B5923D}" type="datetimeFigureOut">
               <a:rPr lang="en-US" dirty="0"/>
               <a:pPr/>
-              <a:t>6/9/2018</a:t>
+              <a:t>6/10/2018</a:t>
             </a:fld>
             <a:endParaRPr lang="en-US" dirty="0"/>
           </a:p>
@@ -5339,7 +5430,7 @@
             <a:fld id="{8E36636D-D922-432D-A958-524484B5923D}" type="datetimeFigureOut">
               <a:rPr lang="en-US" dirty="0"/>
               <a:pPr/>
-              <a:t>6/9/2018</a:t>
+              <a:t>6/10/2018</a:t>
             </a:fld>
             <a:endParaRPr lang="en-US" dirty="0"/>
           </a:p>
@@ -5636,7 +5727,7 @@
             <a:fld id="{8E36636D-D922-432D-A958-524484B5923D}" type="datetimeFigureOut">
               <a:rPr lang="en-US" dirty="0"/>
               <a:pPr/>
-              <a:t>6/9/2018</a:t>
+              <a:t>6/10/2018</a:t>
             </a:fld>
             <a:endParaRPr lang="en-US" dirty="0"/>
           </a:p>
@@ -5867,7 +5958,7 @@
             <a:fld id="{8E36636D-D922-432D-A958-524484B5923D}" type="datetimeFigureOut">
               <a:rPr lang="en-US" dirty="0"/>
               <a:pPr/>
-              <a:t>6/9/2018</a:t>
+              <a:t>6/10/2018</a:t>
             </a:fld>
             <a:endParaRPr lang="en-US" dirty="0"/>
           </a:p>
@@ -6595,6 +6686,19 @@
               <a:t> 2018, Donal Mee</a:t>
             </a:r>
           </a:p>
+          <a:p>
+            <a:r>
+              <a:rPr lang="en-GB">
+                <a:hlinkClick r:id="rId2"/>
+              </a:rPr>
+              <a:t>https://github.com/ddmee/pylondinium2018</a:t>
+            </a:r>
+            <a:r>
+              <a:rPr lang="en-GB"/>
+              <a:t> </a:t>
+            </a:r>
+            <a:endParaRPr lang="en-GB" dirty="0"/>
+          </a:p>
         </p:txBody>
       </p:sp>
     </p:spTree>
@@ -6643,16 +6747,21 @@
             <p:ph type="title"/>
           </p:nvPr>
         </p:nvSpPr>
-        <p:spPr/>
+        <p:spPr>
+          <a:xfrm>
+            <a:off x="913794" y="609600"/>
+            <a:ext cx="10449149" cy="970450"/>
+          </a:xfrm>
+        </p:spPr>
         <p:txBody>
           <a:bodyPr>
-            <a:normAutofit fontScale="90000"/>
+            <a:normAutofit/>
           </a:bodyPr>
           <a:lstStyle/>
           <a:p>
             <a:r>
               <a:rPr lang="en-GB" dirty="0"/>
-              <a:t>Rule 1: Keeping it simple is the aim of the testing game</a:t>
+              <a:t>Tip 3: Keep it simple is the aim</a:t>
             </a:r>
           </a:p>
         </p:txBody>
@@ -6746,7 +6855,7 @@
           <a:p>
             <a:r>
               <a:rPr lang="en-GB" dirty="0"/>
-              <a:t>Tip 2: Choose your tool: the single-afternoon suggestion</a:t>
+              <a:t>Tip 4: Choosing tools: the single-afternoon suggestion</a:t>
             </a:r>
           </a:p>
         </p:txBody>
@@ -6774,12 +6883,6 @@
           <a:p>
             <a:r>
               <a:rPr lang="en-GB" dirty="0"/>
-              <a:t>Remember, tip 1 was call it programmatic testing not automated. So, this is tip 2…</a:t>
-            </a:r>
-          </a:p>
-          <a:p>
-            <a:r>
-              <a:rPr lang="en-GB" dirty="0"/>
               <a:t>Testing is all about appropriate tool choice. Tooling sensitive. </a:t>
             </a:r>
           </a:p>
@@ -6790,7 +6893,7 @@
             </a:r>
             <a:r>
               <a:rPr lang="en-GB" dirty="0" err="1"/>
-              <a:t>cherrypy</a:t>
+              <a:t>CherryPy</a:t>
             </a:r>
             <a:r>
               <a:rPr lang="en-GB" dirty="0"/>
@@ -6798,7 +6901,7 @@
             </a:r>
             <a:r>
               <a:rPr lang="en-GB" dirty="0">
-                <a:hlinkClick r:id="rId2"/>
+                <a:hlinkClick r:id="rId3"/>
               </a:rPr>
               <a:t>https://bottlepy.org/docs/dev</a:t>
             </a:r>
@@ -6814,7 +6917,7 @@
             </a:r>
             <a:r>
               <a:rPr lang="en-GB" dirty="0">
-                <a:hlinkClick r:id="rId3"/>
+                <a:hlinkClick r:id="rId4"/>
               </a:rPr>
               <a:t>https://github.com/jaimegildesagredo/expects</a:t>
             </a:r>
@@ -6903,7 +7006,7 @@
           <p:cNvPr id="2" name="Title 1">
             <a:extLst>
               <a:ext uri="{FF2B5EF4-FFF2-40B4-BE49-F238E27FC236}">
-                <a16:creationId xmlns:a16="http://schemas.microsoft.com/office/drawing/2014/main" id="{8F33899C-E5D5-409B-B222-E4163DE044C0}"/>
+                <a16:creationId xmlns:a16="http://schemas.microsoft.com/office/drawing/2014/main" id="{2B0B44A4-50CE-4E66-914C-A423171BB488}"/>
               </a:ext>
             </a:extLst>
           </p:cNvPr>
@@ -6921,7 +7024,7 @@
           <a:p>
             <a:r>
               <a:rPr lang="en-GB" dirty="0"/>
-              <a:t>Raise exception to rule</a:t>
+              <a:t>Python exception to the rule</a:t>
             </a:r>
           </a:p>
         </p:txBody>
@@ -6931,7 +7034,7 @@
           <p:cNvPr id="3" name="Content Placeholder 2">
             <a:extLst>
               <a:ext uri="{FF2B5EF4-FFF2-40B4-BE49-F238E27FC236}">
-                <a16:creationId xmlns:a16="http://schemas.microsoft.com/office/drawing/2014/main" id="{C9F9BA58-E0D9-444B-A1F3-B8DE2D9E95AB}"/>
+                <a16:creationId xmlns:a16="http://schemas.microsoft.com/office/drawing/2014/main" id="{F04DFFE1-8405-4C36-841A-7D7E760F990C}"/>
               </a:ext>
             </a:extLst>
           </p:cNvPr>
@@ -6943,59 +7046,169 @@
           </p:nvPr>
         </p:nvSpPr>
         <p:spPr/>
-        <p:txBody>
-          <a:bodyPr/>
-          <a:lstStyle/>
-          <a:p>
-            <a:r>
-              <a:rPr lang="en-GB" dirty="0"/>
-              <a:t>Trackback: Rule1: keep it simple is the aim of the testing game…Tip 2: Choose you tool: the single afternoon rule.</a:t>
-            </a:r>
-          </a:p>
-          <a:p>
+        <p:style>
+          <a:lnRef idx="2">
+            <a:schemeClr val="accent2"/>
+          </a:lnRef>
+          <a:fillRef idx="1">
+            <a:schemeClr val="lt1"/>
+          </a:fillRef>
+          <a:effectRef idx="0">
+            <a:schemeClr val="accent2"/>
+          </a:effectRef>
+          <a:fontRef idx="minor">
+            <a:schemeClr val="dk1"/>
+          </a:fontRef>
+        </p:style>
+        <p:txBody>
+          <a:bodyPr>
+            <a:normAutofit fontScale="85000" lnSpcReduction="20000"/>
+          </a:bodyPr>
+          <a:lstStyle/>
+          <a:p>
+            <a:r>
+              <a:rPr lang="en-GB" dirty="0"/>
+              <a:t>Test failed </a:t>
+            </a:r>
+            <a:r>
+              <a:rPr lang="en-GB" dirty="0" err="1"/>
+              <a:t>what_about_python_learning_python</a:t>
+            </a:r>
+            <a:endParaRPr lang="en-GB" dirty="0"/>
+          </a:p>
+          <a:p>
+            <a:endParaRPr lang="en-GB" dirty="0"/>
+          </a:p>
+          <a:p>
+            <a:r>
+              <a:rPr lang="en-GB" dirty="0"/>
+              <a:t>Traceback (most recent call last):</a:t>
+            </a:r>
+          </a:p>
+          <a:p>
+            <a:r>
+              <a:rPr lang="en-GB" dirty="0"/>
+              <a:t>  File "C:\Users\dmee\code\pylondinium2018\ss_testing.py", line 41, in _</a:t>
+            </a:r>
+            <a:r>
+              <a:rPr lang="en-GB" dirty="0" err="1"/>
+              <a:t>execute_a_test</a:t>
+            </a:r>
+            <a:endParaRPr lang="en-GB" dirty="0"/>
+          </a:p>
+          <a:p>
+            <a:r>
+              <a:rPr lang="en-GB" dirty="0"/>
+              <a:t>    </a:t>
+            </a:r>
+            <a:r>
+              <a:rPr lang="en-GB" dirty="0" err="1"/>
+              <a:t>test_fnc</a:t>
+            </a:r>
+            <a:r>
+              <a:rPr lang="en-GB" dirty="0"/>
+              <a:t>()</a:t>
+            </a:r>
+          </a:p>
+          <a:p>
+            <a:r>
+              <a:rPr lang="en-GB" dirty="0"/>
+              <a:t>  File ".\python_time_error.py", line 12, in </a:t>
+            </a:r>
+            <a:r>
+              <a:rPr lang="en-GB" dirty="0" err="1"/>
+              <a:t>what_about_python_learning_python</a:t>
+            </a:r>
+            <a:endParaRPr lang="en-GB" dirty="0"/>
+          </a:p>
+          <a:p>
+            <a:r>
+              <a:rPr lang="en-GB" dirty="0"/>
+              <a:t>    </a:t>
+            </a:r>
+            <a:r>
+              <a:rPr lang="en-GB" dirty="0" err="1"/>
+              <a:t>keep_it_simple</a:t>
+            </a:r>
+            <a:r>
+              <a:rPr lang="en-GB" dirty="0"/>
+              <a:t>(</a:t>
+            </a:r>
+            <a:r>
+              <a:rPr lang="en-GB" dirty="0" err="1"/>
+              <a:t>time_to_learn</a:t>
+            </a:r>
+            <a:r>
+              <a:rPr lang="en-GB" dirty="0"/>
+              <a:t>)</a:t>
+            </a:r>
+          </a:p>
+          <a:p>
+            <a:r>
+              <a:rPr lang="en-GB" dirty="0"/>
+              <a:t>  File ".\python_time_error.py", line 4, in </a:t>
+            </a:r>
+            <a:r>
+              <a:rPr lang="en-GB" dirty="0" err="1"/>
+              <a:t>keep_it_simple</a:t>
+            </a:r>
+            <a:endParaRPr lang="en-GB" dirty="0"/>
+          </a:p>
+          <a:p>
+            <a:r>
+              <a:rPr lang="en-GB" dirty="0"/>
+              <a:t>    </a:t>
+            </a:r>
+            <a:r>
+              <a:rPr lang="en-GB" dirty="0" err="1"/>
+              <a:t>choose_your_tool</a:t>
+            </a:r>
+            <a:r>
+              <a:rPr lang="en-GB" dirty="0"/>
+              <a:t>(</a:t>
+            </a:r>
+            <a:r>
+              <a:rPr lang="en-GB" dirty="0" err="1"/>
+              <a:t>time_complexity</a:t>
+            </a:r>
+            <a:r>
+              <a:rPr lang="en-GB" dirty="0"/>
+              <a:t>)</a:t>
+            </a:r>
+          </a:p>
+          <a:p>
+            <a:r>
+              <a:rPr lang="en-GB" dirty="0"/>
+              <a:t>  File ".\python_time_error.py", line 8, in </a:t>
+            </a:r>
+            <a:r>
+              <a:rPr lang="en-GB" dirty="0" err="1"/>
+              <a:t>choose_your_tool</a:t>
+            </a:r>
+            <a:endParaRPr lang="en-GB" dirty="0"/>
+          </a:p>
+          <a:p>
+            <a:r>
+              <a:rPr lang="en-GB" dirty="0"/>
+              <a:t>    raise </a:t>
+            </a:r>
             <a:r>
               <a:rPr lang="en-GB" dirty="0" err="1"/>
               <a:t>AssertionError</a:t>
             </a:r>
             <a:r>
               <a:rPr lang="en-GB" dirty="0"/>
-              <a:t>(“Python takes longer than an afternoon to learn”)</a:t>
-            </a:r>
-          </a:p>
-          <a:p>
-            <a:r>
-              <a:rPr lang="en-GB" dirty="0"/>
-              <a:t>Yes, python is the exception that facilities the rule.</a:t>
-            </a:r>
-          </a:p>
-          <a:p>
-            <a:r>
-              <a:rPr lang="en-GB" dirty="0"/>
-              <a:t>Empowerment via python, not via other peoples python code</a:t>
-            </a:r>
-          </a:p>
-          <a:p>
-            <a:r>
-              <a:rPr lang="en-GB" dirty="0"/>
-              <a:t>Testing time is TIGHT.</a:t>
-            </a:r>
-          </a:p>
-          <a:p>
-            <a:r>
-              <a:rPr lang="en-GB" dirty="0"/>
-              <a:t>Ducking typing/interpretation == flexibility and power but GOD awful code.</a:t>
-            </a:r>
-          </a:p>
-          <a:p>
-            <a:r>
-              <a:rPr lang="en-GB" dirty="0"/>
-              <a:t>Walks like a duck, quacks like a duck, is as ugly as duck.</a:t>
-            </a:r>
-          </a:p>
-          <a:p>
-            <a:r>
-              <a:rPr lang="en-GB" dirty="0"/>
-              <a:t>Good tester, bad python programmer?</a:t>
+              <a:t>("Time is greater than one afternoon")</a:t>
+            </a:r>
+          </a:p>
+          <a:p>
+            <a:r>
+              <a:rPr lang="en-GB" dirty="0" err="1"/>
+              <a:t>AssertionError</a:t>
+            </a:r>
+            <a:r>
+              <a:rPr lang="en-GB" dirty="0"/>
+              <a:t>: Time is greater than one afternoon</a:t>
             </a:r>
           </a:p>
         </p:txBody>
@@ -7003,7 +7216,7 @@
     </p:spTree>
     <p:extLst>
       <p:ext uri="{BB962C8B-B14F-4D97-AF65-F5344CB8AC3E}">
-        <p14:creationId xmlns:p14="http://schemas.microsoft.com/office/powerpoint/2010/main" val="3675564945"/>
+        <p14:creationId xmlns:p14="http://schemas.microsoft.com/office/powerpoint/2010/main" val="2229437795"/>
       </p:ext>
     </p:extLst>
   </p:cSld>
@@ -7035,6 +7248,116 @@
           <p:cNvPr id="2" name="Title 1">
             <a:extLst>
               <a:ext uri="{FF2B5EF4-FFF2-40B4-BE49-F238E27FC236}">
+                <a16:creationId xmlns:a16="http://schemas.microsoft.com/office/drawing/2014/main" id="{8F33899C-E5D5-409B-B222-E4163DE044C0}"/>
+              </a:ext>
+            </a:extLst>
+          </p:cNvPr>
+          <p:cNvSpPr>
+            <a:spLocks noGrp="1"/>
+          </p:cNvSpPr>
+          <p:nvPr>
+            <p:ph type="title"/>
+          </p:nvPr>
+        </p:nvSpPr>
+        <p:spPr/>
+        <p:txBody>
+          <a:bodyPr/>
+          <a:lstStyle/>
+          <a:p>
+            <a:r>
+              <a:rPr lang="en-GB" dirty="0"/>
+              <a:t>Exception that facilitates the rule</a:t>
+            </a:r>
+          </a:p>
+        </p:txBody>
+      </p:sp>
+      <p:sp>
+        <p:nvSpPr>
+          <p:cNvPr id="3" name="Content Placeholder 2">
+            <a:extLst>
+              <a:ext uri="{FF2B5EF4-FFF2-40B4-BE49-F238E27FC236}">
+                <a16:creationId xmlns:a16="http://schemas.microsoft.com/office/drawing/2014/main" id="{C9F9BA58-E0D9-444B-A1F3-B8DE2D9E95AB}"/>
+              </a:ext>
+            </a:extLst>
+          </p:cNvPr>
+          <p:cNvSpPr>
+            <a:spLocks noGrp="1"/>
+          </p:cNvSpPr>
+          <p:nvPr>
+            <p:ph idx="1"/>
+          </p:nvPr>
+        </p:nvSpPr>
+        <p:spPr/>
+        <p:txBody>
+          <a:bodyPr/>
+          <a:lstStyle/>
+          <a:p>
+            <a:r>
+              <a:rPr lang="en-GB" dirty="0"/>
+              <a:t>Empowerment via python.</a:t>
+            </a:r>
+          </a:p>
+          <a:p>
+            <a:r>
+              <a:rPr lang="en-GB" dirty="0"/>
+              <a:t>Testing time is TIGHT.</a:t>
+            </a:r>
+          </a:p>
+          <a:p>
+            <a:r>
+              <a:rPr lang="en-GB" dirty="0"/>
+              <a:t>Ducking typing/interpretation == flexibility and power but GOD awful code.</a:t>
+            </a:r>
+          </a:p>
+          <a:p>
+            <a:r>
+              <a:rPr lang="en-GB" dirty="0"/>
+              <a:t>Walks like a duck, quacks like a duck, is as ugly as duck.</a:t>
+            </a:r>
+          </a:p>
+          <a:p>
+            <a:r>
+              <a:rPr lang="en-GB" dirty="0"/>
+              <a:t>Good tester, bad python programmer?</a:t>
+            </a:r>
+          </a:p>
+        </p:txBody>
+      </p:sp>
+    </p:spTree>
+    <p:extLst>
+      <p:ext uri="{BB962C8B-B14F-4D97-AF65-F5344CB8AC3E}">
+        <p14:creationId xmlns:p14="http://schemas.microsoft.com/office/powerpoint/2010/main" val="3675564945"/>
+      </p:ext>
+    </p:extLst>
+  </p:cSld>
+  <p:clrMapOvr>
+    <a:masterClrMapping/>
+  </p:clrMapOvr>
+</p:sld>
+</file>
+
+<file path=ppt/slides/slide14.xml><?xml version="1.0" encoding="utf-8"?>
+<p:sld xmlns:a="http://schemas.openxmlformats.org/drawingml/2006/main" xmlns:r="http://schemas.openxmlformats.org/officeDocument/2006/relationships" xmlns:p="http://schemas.openxmlformats.org/presentationml/2006/main">
+  <p:cSld>
+    <p:spTree>
+      <p:nvGrpSpPr>
+        <p:cNvPr id="1" name=""/>
+        <p:cNvGrpSpPr/>
+        <p:nvPr/>
+      </p:nvGrpSpPr>
+      <p:grpSpPr>
+        <a:xfrm>
+          <a:off x="0" y="0"/>
+          <a:ext cx="0" cy="0"/>
+          <a:chOff x="0" y="0"/>
+          <a:chExt cx="0" cy="0"/>
+        </a:xfrm>
+      </p:grpSpPr>
+      <p:sp>
+        <p:nvSpPr>
+          <p:cNvPr id="2" name="Title 1">
+            <a:extLst>
+              <a:ext uri="{FF2B5EF4-FFF2-40B4-BE49-F238E27FC236}">
                 <a16:creationId xmlns:a16="http://schemas.microsoft.com/office/drawing/2014/main" id="{979D3717-9637-4F7F-9436-C9CA4FC75803}"/>
               </a:ext>
             </a:extLst>
@@ -7081,14 +7404,13 @@
           <a:p>
             <a:r>
               <a:rPr lang="en-GB" dirty="0"/>
-              <a:t>Too much talky-talky already…</a:t>
-            </a:r>
-          </a:p>
-          <a:p>
-            <a:r>
-              <a:rPr lang="en-GB" dirty="0"/>
-              <a:t>Replacing your test frameworks in pure python.</a:t>
-            </a:r>
+              <a:t>Too much talky-talky </a:t>
+            </a:r>
+            <a:r>
+              <a:rPr lang="en-GB"/>
+              <a:t>already…</a:t>
+            </a:r>
+            <a:endParaRPr lang="en-GB" dirty="0"/>
           </a:p>
         </p:txBody>
       </p:sp>
@@ -7105,7 +7427,118 @@
 </p:sld>
 </file>
 
-<file path=ppt/slides/slide14.xml><?xml version="1.0" encoding="utf-8"?>
+<file path=ppt/slides/slide15.xml><?xml version="1.0" encoding="utf-8"?>
+<p:sld xmlns:a="http://schemas.openxmlformats.org/drawingml/2006/main" xmlns:r="http://schemas.openxmlformats.org/officeDocument/2006/relationships" xmlns:p="http://schemas.openxmlformats.org/presentationml/2006/main">
+  <p:cSld>
+    <p:spTree>
+      <p:nvGrpSpPr>
+        <p:cNvPr id="1" name=""/>
+        <p:cNvGrpSpPr/>
+        <p:nvPr/>
+      </p:nvGrpSpPr>
+      <p:grpSpPr>
+        <a:xfrm>
+          <a:off x="0" y="0"/>
+          <a:ext cx="0" cy="0"/>
+          <a:chOff x="0" y="0"/>
+          <a:chExt cx="0" cy="0"/>
+        </a:xfrm>
+      </p:grpSpPr>
+      <p:sp>
+        <p:nvSpPr>
+          <p:cNvPr id="2" name="Title 1">
+            <a:extLst>
+              <a:ext uri="{FF2B5EF4-FFF2-40B4-BE49-F238E27FC236}">
+                <a16:creationId xmlns:a16="http://schemas.microsoft.com/office/drawing/2014/main" id="{7BAEA224-E322-4D2A-B7A4-590C33BB8D25}"/>
+              </a:ext>
+            </a:extLst>
+          </p:cNvPr>
+          <p:cNvSpPr>
+            <a:spLocks noGrp="1"/>
+          </p:cNvSpPr>
+          <p:nvPr>
+            <p:ph type="title"/>
+          </p:nvPr>
+        </p:nvSpPr>
+        <p:spPr/>
+        <p:txBody>
+          <a:bodyPr/>
+          <a:lstStyle/>
+          <a:p>
+            <a:r>
+              <a:rPr lang="en-GB" dirty="0"/>
+              <a:t>I am not saying…</a:t>
+            </a:r>
+          </a:p>
+        </p:txBody>
+      </p:sp>
+      <p:sp>
+        <p:nvSpPr>
+          <p:cNvPr id="3" name="Content Placeholder 2">
+            <a:extLst>
+              <a:ext uri="{FF2B5EF4-FFF2-40B4-BE49-F238E27FC236}">
+                <a16:creationId xmlns:a16="http://schemas.microsoft.com/office/drawing/2014/main" id="{7DA3D112-5639-4E07-8D8C-0D5B0763BB2D}"/>
+              </a:ext>
+            </a:extLst>
+          </p:cNvPr>
+          <p:cNvSpPr>
+            <a:spLocks noGrp="1"/>
+          </p:cNvSpPr>
+          <p:nvPr>
+            <p:ph idx="1"/>
+          </p:nvPr>
+        </p:nvSpPr>
+        <p:spPr/>
+        <p:txBody>
+          <a:bodyPr/>
+          <a:lstStyle/>
+          <a:p>
+            <a:r>
+              <a:rPr lang="en-GB" dirty="0"/>
+              <a:t>Tests I have written in the example are good or the framework is complete. I wrote it in an hour or two.</a:t>
+            </a:r>
+          </a:p>
+          <a:p>
+            <a:r>
+              <a:rPr lang="en-GB" dirty="0"/>
+              <a:t>That you can’t use tools like </a:t>
+            </a:r>
+            <a:r>
+              <a:rPr lang="en-GB" dirty="0" err="1"/>
+              <a:t>pytest</a:t>
+            </a:r>
+            <a:r>
+              <a:rPr lang="en-GB" dirty="0"/>
+              <a:t>/</a:t>
+            </a:r>
+            <a:r>
+              <a:rPr lang="en-GB" dirty="0" err="1"/>
+              <a:t>CherryPy</a:t>
+            </a:r>
+            <a:r>
+              <a:rPr lang="en-GB" dirty="0"/>
+              <a:t>. But there is a burden if you do, and your preference is normally to find the lightest thing you can.</a:t>
+            </a:r>
+          </a:p>
+          <a:p>
+            <a:endParaRPr lang="en-GB" dirty="0"/>
+          </a:p>
+        </p:txBody>
+      </p:sp>
+    </p:spTree>
+    <p:extLst>
+      <p:ext uri="{BB962C8B-B14F-4D97-AF65-F5344CB8AC3E}">
+        <p14:creationId xmlns:p14="http://schemas.microsoft.com/office/powerpoint/2010/main" val="191157339"/>
+      </p:ext>
+    </p:extLst>
+  </p:cSld>
+  <p:clrMapOvr>
+    <a:masterClrMapping/>
+  </p:clrMapOvr>
+</p:sld>
+</file>
+
+<file path=ppt/slides/slide16.xml><?xml version="1.0" encoding="utf-8"?>
 <p:sld xmlns:a="http://schemas.openxmlformats.org/drawingml/2006/main" xmlns:r="http://schemas.openxmlformats.org/officeDocument/2006/relationships" xmlns:p="http://schemas.openxmlformats.org/presentationml/2006/main">
   <p:cSld>
     <p:spTree>
@@ -7827,7 +8260,7 @@
           <a:p>
             <a:r>
               <a:rPr lang="en-GB" dirty="0"/>
-              <a:t>Introduction</a:t>
+              <a:t>Me</a:t>
             </a:r>
           </a:p>
         </p:txBody>
@@ -7864,7 +8297,13 @@
           <a:p>
             <a:r>
               <a:rPr lang="en-GB" dirty="0"/>
-              <a:t>Testing is absolutely no-ones favourite topic</a:t>
+              <a:t>Thanks to the organisers, Bloomberg and Python!</a:t>
+            </a:r>
+          </a:p>
+          <a:p>
+            <a:r>
+              <a:rPr lang="en-GB" dirty="0"/>
+              <a:t>Testing no-ones favourite topic?</a:t>
             </a:r>
           </a:p>
           <a:p>
@@ -7956,7 +8395,7 @@
           <a:p>
             <a:r>
               <a:rPr lang="en-GB" dirty="0"/>
-              <a:t>Intended to speak about </a:t>
+              <a:t>Original planned to speak about </a:t>
             </a:r>
             <a:r>
               <a:rPr lang="en-GB" dirty="0" err="1"/>
@@ -7970,13 +8409,41 @@
           <a:p>
             <a:r>
               <a:rPr lang="en-GB" dirty="0"/>
-              <a:t>But, too complex, too many things unexplained.</a:t>
-            </a:r>
-          </a:p>
-          <a:p>
-            <a:r>
-              <a:rPr lang="en-GB" dirty="0"/>
-              <a:t>Backs to basics – right at the start. What are we doing, how do we do it?</a:t>
+              <a:t>But, too complex, too many things unexplained. </a:t>
+            </a:r>
+          </a:p>
+          <a:p>
+            <a:r>
+              <a:rPr lang="en-GB" dirty="0"/>
+              <a:t>Backs to basics – starting from the start.</a:t>
+            </a:r>
+          </a:p>
+          <a:p>
+            <a:pPr lvl="1"/>
+            <a:r>
+              <a:rPr lang="en-GB" dirty="0"/>
+              <a:t>Is testing different to development?</a:t>
+            </a:r>
+          </a:p>
+          <a:p>
+            <a:pPr lvl="1"/>
+            <a:r>
+              <a:rPr lang="en-GB" dirty="0"/>
+              <a:t>Why do we test things?</a:t>
+            </a:r>
+          </a:p>
+          <a:p>
+            <a:pPr lvl="1"/>
+            <a:r>
+              <a:rPr lang="en-GB" dirty="0"/>
+              <a:t>testing != verification.</a:t>
+            </a:r>
+          </a:p>
+          <a:p>
+            <a:pPr lvl="1"/>
+            <a:r>
+              <a:rPr lang="en-GB" dirty="0"/>
+              <a:t>Keep it simple.</a:t>
             </a:r>
           </a:p>
           <a:p>
@@ -8088,6 +8555,18 @@
           <a:p>
             <a:r>
               <a:rPr lang="en-GB" dirty="0"/>
+              <a:t>~50%</a:t>
+            </a:r>
+          </a:p>
+          <a:p>
+            <a:pPr marL="36900" indent="0">
+              <a:buNone/>
+            </a:pPr>
+            <a:endParaRPr lang="en-GB" dirty="0"/>
+          </a:p>
+          <a:p>
+            <a:r>
+              <a:rPr lang="en-GB" dirty="0"/>
               <a:t>‘test developer/</a:t>
             </a:r>
             <a:r>
@@ -8110,7 +8589,13 @@
             </a:r>
             <a:r>
               <a:rPr lang="en-GB" dirty="0"/>
-              <a:t>’ and ‘python’ == 38 jobs.</a:t>
+              <a:t>’ and ‘python’ == 38 jobs. </a:t>
+            </a:r>
+          </a:p>
+          <a:p>
+            <a:r>
+              <a:rPr lang="en-GB" dirty="0"/>
+              <a:t>~30%</a:t>
             </a:r>
           </a:p>
         </p:txBody>
@@ -8196,19 +8681,19 @@
           <a:p>
             <a:r>
               <a:rPr lang="en-GB" dirty="0"/>
-              <a:t>Painful</a:t>
-            </a:r>
-          </a:p>
-          <a:p>
-            <a:r>
-              <a:rPr lang="en-GB" dirty="0"/>
-              <a:t>Unpopular</a:t>
-            </a:r>
-          </a:p>
-          <a:p>
-            <a:r>
-              <a:rPr lang="en-GB" dirty="0"/>
-              <a:t>Ideally, we wouldn’t have to test</a:t>
+              <a:t>Painful.</a:t>
+            </a:r>
+          </a:p>
+          <a:p>
+            <a:r>
+              <a:rPr lang="en-GB" dirty="0"/>
+              <a:t>Unpopular.</a:t>
+            </a:r>
+          </a:p>
+          <a:p>
+            <a:r>
+              <a:rPr lang="en-GB" dirty="0"/>
+              <a:t>Ideally, we wouldn’t have to test.</a:t>
             </a:r>
           </a:p>
           <a:p>
@@ -8220,7 +8705,15 @@
           <a:p>
             <a:r>
               <a:rPr lang="en-GB" dirty="0"/>
-              <a:t>I once overhead, “If they write a bug we should make them wear a dunce’s hat”.</a:t>
+              <a:t>I once overhead, “</a:t>
+            </a:r>
+            <a:r>
+              <a:rPr lang="en-GB" i="1" dirty="0"/>
+              <a:t>If they write a bug, we should make them wear a dunce’s hat</a:t>
+            </a:r>
+            <a:r>
+              <a:rPr lang="en-GB" dirty="0"/>
+              <a:t>”.</a:t>
             </a:r>
           </a:p>
         </p:txBody>
@@ -8280,7 +8773,7 @@
           <a:p>
             <a:r>
               <a:rPr lang="en-GB" dirty="0"/>
-              <a:t>But is there a difference between testing and development?</a:t>
+              <a:t>But Is there a difference between testing and development?</a:t>
             </a:r>
           </a:p>
         </p:txBody>
@@ -8589,7 +9082,7 @@
           <a:p>
             <a:r>
               <a:rPr lang="en-GB" dirty="0"/>
-              <a:t>Rule 0: Testing is not verification</a:t>
+              <a:t>Tip 2: Testing is not verification</a:t>
             </a:r>
           </a:p>
         </p:txBody>
@@ -8617,23 +9110,307 @@
           <a:p>
             <a:r>
               <a:rPr lang="en-GB" dirty="0"/>
-              <a:t>Testing will no provide the product is free from bugs. That’s verification. </a:t>
-            </a:r>
-          </a:p>
-          <a:p>
-            <a:r>
-              <a:rPr lang="en-GB" dirty="0"/>
-              <a:t>Testing shows the product can work.</a:t>
-            </a:r>
-          </a:p>
-          <a:p>
-            <a:r>
-              <a:rPr lang="en-GB" dirty="0"/>
-              <a:t>More significant a systems, the more we require verification. Insignificant ~= testing.</a:t>
+              <a:t>Testing does not prove that the product is free from bugs. That’s verification. </a:t>
+            </a:r>
+          </a:p>
+          <a:p>
+            <a:r>
+              <a:rPr lang="en-GB" dirty="0"/>
+              <a:t>Testing merely shows the product can work.</a:t>
             </a:r>
           </a:p>
           <a:p>
             <a:endParaRPr lang="en-GB" dirty="0"/>
+          </a:p>
+          <a:p>
+            <a:endParaRPr lang="en-GB" dirty="0"/>
+          </a:p>
+        </p:txBody>
+      </p:sp>
+      <p:sp>
+        <p:nvSpPr>
+          <p:cNvPr id="9" name="TextBox 8">
+            <a:extLst>
+              <a:ext uri="{FF2B5EF4-FFF2-40B4-BE49-F238E27FC236}">
+                <a16:creationId xmlns:a16="http://schemas.microsoft.com/office/drawing/2014/main" id="{4D82BB1D-21C2-4815-ABEC-E992E291CB0B}"/>
+              </a:ext>
+            </a:extLst>
+          </p:cNvPr>
+          <p:cNvSpPr txBox="1"/>
+          <p:nvPr/>
+        </p:nvSpPr>
+        <p:spPr>
+          <a:xfrm>
+            <a:off x="4139790" y="2880359"/>
+            <a:ext cx="3589938" cy="523220"/>
+          </a:xfrm>
+          <a:prstGeom prst="rect">
+            <a:avLst/>
+          </a:prstGeom>
+          <a:noFill/>
+        </p:spPr>
+        <p:txBody>
+          <a:bodyPr wrap="square" rtlCol="0">
+            <a:spAutoFit/>
+          </a:bodyPr>
+          <a:lstStyle/>
+          <a:p>
+            <a:r>
+              <a:rPr lang="en-GB" sz="2800" dirty="0"/>
+              <a:t>Scale of Significance</a:t>
+            </a:r>
+          </a:p>
+        </p:txBody>
+      </p:sp>
+      <p:sp>
+        <p:nvSpPr>
+          <p:cNvPr id="10" name="Speech Bubble: Rectangle 9">
+            <a:extLst>
+              <a:ext uri="{FF2B5EF4-FFF2-40B4-BE49-F238E27FC236}">
+                <a16:creationId xmlns:a16="http://schemas.microsoft.com/office/drawing/2014/main" id="{2044FDB7-0324-4EDC-B3CF-E64BAD7C6597}"/>
+              </a:ext>
+            </a:extLst>
+          </p:cNvPr>
+          <p:cNvSpPr/>
+          <p:nvPr/>
+        </p:nvSpPr>
+        <p:spPr>
+          <a:xfrm>
+            <a:off x="2121711" y="2799996"/>
+            <a:ext cx="1744061" cy="1170433"/>
+          </a:xfrm>
+          <a:prstGeom prst="wedgeRectCallout">
+            <a:avLst>
+              <a:gd name="adj1" fmla="val -30620"/>
+              <a:gd name="adj2" fmla="val 78125"/>
+            </a:avLst>
+          </a:prstGeom>
+        </p:spPr>
+        <p:style>
+          <a:lnRef idx="2">
+            <a:schemeClr val="accent1">
+              <a:shade val="50000"/>
+            </a:schemeClr>
+          </a:lnRef>
+          <a:fillRef idx="1">
+            <a:schemeClr val="accent1"/>
+          </a:fillRef>
+          <a:effectRef idx="0">
+            <a:schemeClr val="accent1"/>
+          </a:effectRef>
+          <a:fontRef idx="minor">
+            <a:schemeClr val="lt1"/>
+          </a:fontRef>
+        </p:style>
+        <p:txBody>
+          <a:bodyPr rtlCol="0" anchor="ctr"/>
+          <a:lstStyle/>
+          <a:p>
+            <a:pPr algn="ctr"/>
+            <a:r>
+              <a:rPr lang="en-GB" dirty="0"/>
+              <a:t>Insignificant</a:t>
+            </a:r>
+          </a:p>
+        </p:txBody>
+      </p:sp>
+      <p:sp>
+        <p:nvSpPr>
+          <p:cNvPr id="11" name="Speech Bubble: Rectangle 10">
+            <a:extLst>
+              <a:ext uri="{FF2B5EF4-FFF2-40B4-BE49-F238E27FC236}">
+                <a16:creationId xmlns:a16="http://schemas.microsoft.com/office/drawing/2014/main" id="{26A1D1E6-A35C-4943-A578-008045EC7807}"/>
+              </a:ext>
+            </a:extLst>
+          </p:cNvPr>
+          <p:cNvSpPr/>
+          <p:nvPr/>
+        </p:nvSpPr>
+        <p:spPr>
+          <a:xfrm>
+            <a:off x="7844947" y="2799996"/>
+            <a:ext cx="1744061" cy="1170433"/>
+          </a:xfrm>
+          <a:prstGeom prst="wedgeRectCallout">
+            <a:avLst>
+              <a:gd name="adj1" fmla="val 32294"/>
+              <a:gd name="adj2" fmla="val 73958"/>
+            </a:avLst>
+          </a:prstGeom>
+        </p:spPr>
+        <p:style>
+          <a:lnRef idx="2">
+            <a:schemeClr val="accent1">
+              <a:shade val="50000"/>
+            </a:schemeClr>
+          </a:lnRef>
+          <a:fillRef idx="1">
+            <a:schemeClr val="accent1"/>
+          </a:fillRef>
+          <a:effectRef idx="0">
+            <a:schemeClr val="accent1"/>
+          </a:effectRef>
+          <a:fontRef idx="minor">
+            <a:schemeClr val="lt1"/>
+          </a:fontRef>
+        </p:style>
+        <p:txBody>
+          <a:bodyPr rtlCol="0" anchor="ctr"/>
+          <a:lstStyle/>
+          <a:p>
+            <a:pPr algn="ctr"/>
+            <a:r>
+              <a:rPr lang="en-GB" dirty="0"/>
+              <a:t>Significant</a:t>
+            </a:r>
+          </a:p>
+        </p:txBody>
+      </p:sp>
+      <p:sp>
+        <p:nvSpPr>
+          <p:cNvPr id="12" name="Speech Bubble: Rectangle 11">
+            <a:extLst>
+              <a:ext uri="{FF2B5EF4-FFF2-40B4-BE49-F238E27FC236}">
+                <a16:creationId xmlns:a16="http://schemas.microsoft.com/office/drawing/2014/main" id="{7474358D-8D52-481D-A8C1-9A23C164311A}"/>
+              </a:ext>
+            </a:extLst>
+          </p:cNvPr>
+          <p:cNvSpPr/>
+          <p:nvPr/>
+        </p:nvSpPr>
+        <p:spPr>
+          <a:xfrm>
+            <a:off x="2132359" y="4891747"/>
+            <a:ext cx="1744061" cy="1170433"/>
+          </a:xfrm>
+          <a:prstGeom prst="wedgeRectCallout">
+            <a:avLst>
+              <a:gd name="adj1" fmla="val -31319"/>
+              <a:gd name="adj2" fmla="val -98958"/>
+            </a:avLst>
+          </a:prstGeom>
+        </p:spPr>
+        <p:style>
+          <a:lnRef idx="2">
+            <a:schemeClr val="accent4">
+              <a:shade val="50000"/>
+            </a:schemeClr>
+          </a:lnRef>
+          <a:fillRef idx="1">
+            <a:schemeClr val="accent4"/>
+          </a:fillRef>
+          <a:effectRef idx="0">
+            <a:schemeClr val="accent4"/>
+          </a:effectRef>
+          <a:fontRef idx="minor">
+            <a:schemeClr val="lt1"/>
+          </a:fontRef>
+        </p:style>
+        <p:txBody>
+          <a:bodyPr rtlCol="0" anchor="ctr"/>
+          <a:lstStyle/>
+          <a:p>
+            <a:pPr algn="ctr"/>
+            <a:r>
+              <a:rPr lang="en-GB" dirty="0"/>
+              <a:t>Testing</a:t>
+            </a:r>
+          </a:p>
+        </p:txBody>
+      </p:sp>
+      <p:sp>
+        <p:nvSpPr>
+          <p:cNvPr id="13" name="Speech Bubble: Rectangle 12">
+            <a:extLst>
+              <a:ext uri="{FF2B5EF4-FFF2-40B4-BE49-F238E27FC236}">
+                <a16:creationId xmlns:a16="http://schemas.microsoft.com/office/drawing/2014/main" id="{CBE53407-5ACD-41A8-B955-D1CE42ABA1A5}"/>
+              </a:ext>
+            </a:extLst>
+          </p:cNvPr>
+          <p:cNvSpPr/>
+          <p:nvPr/>
+        </p:nvSpPr>
+        <p:spPr>
+          <a:xfrm>
+            <a:off x="7844947" y="4923605"/>
+            <a:ext cx="1744061" cy="1170433"/>
+          </a:xfrm>
+          <a:prstGeom prst="wedgeRectCallout">
+            <a:avLst>
+              <a:gd name="adj1" fmla="val 34392"/>
+              <a:gd name="adj2" fmla="val -101041"/>
+            </a:avLst>
+          </a:prstGeom>
+        </p:spPr>
+        <p:style>
+          <a:lnRef idx="2">
+            <a:schemeClr val="accent4">
+              <a:shade val="50000"/>
+            </a:schemeClr>
+          </a:lnRef>
+          <a:fillRef idx="1">
+            <a:schemeClr val="accent4"/>
+          </a:fillRef>
+          <a:effectRef idx="0">
+            <a:schemeClr val="accent4"/>
+          </a:effectRef>
+          <a:fontRef idx="minor">
+            <a:schemeClr val="lt1"/>
+          </a:fontRef>
+        </p:style>
+        <p:txBody>
+          <a:bodyPr rtlCol="0" anchor="ctr"/>
+          <a:lstStyle/>
+          <a:p>
+            <a:pPr algn="ctr"/>
+            <a:r>
+              <a:rPr lang="en-GB" dirty="0"/>
+              <a:t>Verification</a:t>
+            </a:r>
+          </a:p>
+        </p:txBody>
+      </p:sp>
+      <p:sp>
+        <p:nvSpPr>
+          <p:cNvPr id="8" name="Arrow: Right 7">
+            <a:extLst>
+              <a:ext uri="{FF2B5EF4-FFF2-40B4-BE49-F238E27FC236}">
+                <a16:creationId xmlns:a16="http://schemas.microsoft.com/office/drawing/2014/main" id="{904466E2-8839-4EAE-911B-13F218D9E05D}"/>
+              </a:ext>
+            </a:extLst>
+          </p:cNvPr>
+          <p:cNvSpPr/>
+          <p:nvPr/>
+        </p:nvSpPr>
+        <p:spPr>
+          <a:xfrm>
+            <a:off x="2132359" y="4075176"/>
+            <a:ext cx="8572217" cy="457200"/>
+          </a:xfrm>
+          <a:prstGeom prst="rightArrow">
+            <a:avLst/>
+          </a:prstGeom>
+        </p:spPr>
+        <p:style>
+          <a:lnRef idx="2">
+            <a:schemeClr val="accent3"/>
+          </a:lnRef>
+          <a:fillRef idx="1">
+            <a:schemeClr val="lt1"/>
+          </a:fillRef>
+          <a:effectRef idx="0">
+            <a:schemeClr val="accent3"/>
+          </a:effectRef>
+          <a:fontRef idx="minor">
+            <a:schemeClr val="dk1"/>
+          </a:fontRef>
+        </p:style>
+        <p:txBody>
+          <a:bodyPr rtlCol="0" anchor="ctr"/>
+          <a:lstStyle/>
+          <a:p>
+            <a:pPr algn="ctr"/>
+            <a:endParaRPr lang="en-GB"/>
           </a:p>
         </p:txBody>
       </p:sp>

</xml_diff>